<commit_message>
Removed unwanted cell outputs
</commit_message>
<xml_diff>
--- a/Media/PeopleCoordinates/Ppl_Coords.pptx
+++ b/Media/PeopleCoordinates/Ppl_Coords.pptx
@@ -8,6 +8,12 @@
     <p:sldId id="256" r:id="rId2"/>
     <p:sldId id="257" r:id="rId3"/>
     <p:sldId id="258" r:id="rId4"/>
+    <p:sldId id="259" r:id="rId5"/>
+    <p:sldId id="260" r:id="rId6"/>
+    <p:sldId id="261" r:id="rId7"/>
+    <p:sldId id="262" r:id="rId8"/>
+    <p:sldId id="263" r:id="rId9"/>
+    <p:sldId id="264" r:id="rId10"/>
   </p:sldIdLst>
   <p:sldSz cx="12192000" cy="6858000"/>
   <p:notesSz cx="6858000" cy="9144000"/>
@@ -3403,66 +3409,6 @@
           <a:chExt cx="0" cy="0"/>
         </a:xfrm>
       </p:grpSpPr>
-      <p:pic>
-        <p:nvPicPr>
-          <p:cNvPr id="5" name="Picture 4" descr="A picture containing line, parallel, screenshot, number&#10;&#10;Description automatically generated">
-            <a:extLst>
-              <a:ext uri="{FF2B5EF4-FFF2-40B4-BE49-F238E27FC236}">
-                <a16:creationId xmlns:a16="http://schemas.microsoft.com/office/drawing/2014/main" id="{75831E7C-15FE-E74B-8640-91E560920FB0}"/>
-              </a:ext>
-            </a:extLst>
-          </p:cNvPr>
-          <p:cNvPicPr>
-            <a:picLocks noChangeAspect="1"/>
-          </p:cNvPicPr>
-          <p:nvPr/>
-        </p:nvPicPr>
-        <p:blipFill>
-          <a:blip r:embed="rId2"/>
-          <a:stretch>
-            <a:fillRect/>
-          </a:stretch>
-        </p:blipFill>
-        <p:spPr>
-          <a:xfrm>
-            <a:off x="868370" y="0"/>
-            <a:ext cx="10455259" cy="6858000"/>
-          </a:xfrm>
-          <a:prstGeom prst="rect">
-            <a:avLst/>
-          </a:prstGeom>
-        </p:spPr>
-      </p:pic>
-      <p:pic>
-        <p:nvPicPr>
-          <p:cNvPr id="7" name="Picture 6" descr="A picture containing line, parallel, plot, number&#10;&#10;Description automatically generated">
-            <a:extLst>
-              <a:ext uri="{FF2B5EF4-FFF2-40B4-BE49-F238E27FC236}">
-                <a16:creationId xmlns:a16="http://schemas.microsoft.com/office/drawing/2014/main" id="{4A1DF31D-60C0-0C43-8773-FABD51538B5F}"/>
-              </a:ext>
-            </a:extLst>
-          </p:cNvPr>
-          <p:cNvPicPr>
-            <a:picLocks noChangeAspect="1"/>
-          </p:cNvPicPr>
-          <p:nvPr/>
-        </p:nvPicPr>
-        <p:blipFill>
-          <a:blip r:embed="rId3"/>
-          <a:stretch>
-            <a:fillRect/>
-          </a:stretch>
-        </p:blipFill>
-        <p:spPr>
-          <a:xfrm>
-            <a:off x="1018370" y="150000"/>
-            <a:ext cx="10455259" cy="6858000"/>
-          </a:xfrm>
-          <a:prstGeom prst="rect">
-            <a:avLst/>
-          </a:prstGeom>
-        </p:spPr>
-      </p:pic>
     </p:spTree>
     <p:extLst>
       <p:ext uri="{BB962C8B-B14F-4D97-AF65-F5344CB8AC3E}">
@@ -3495,10 +3441,10 @@
       </p:grpSpPr>
       <p:grpSp>
         <p:nvGrpSpPr>
-          <p:cNvPr id="18" name="Group 17">
-            <a:extLst>
-              <a:ext uri="{FF2B5EF4-FFF2-40B4-BE49-F238E27FC236}">
-                <a16:creationId xmlns:a16="http://schemas.microsoft.com/office/drawing/2014/main" id="{17149600-BE7F-2B4F-B971-63020196B6B6}"/>
+          <p:cNvPr id="21" name="Group 20">
+            <a:extLst>
+              <a:ext uri="{FF2B5EF4-FFF2-40B4-BE49-F238E27FC236}">
+                <a16:creationId xmlns:a16="http://schemas.microsoft.com/office/drawing/2014/main" id="{FE8C47CE-FEF2-8B4F-8249-7ABEE7B4FF55}"/>
               </a:ext>
             </a:extLst>
           </p:cNvPr>
@@ -3507,48 +3453,18 @@
         </p:nvGrpSpPr>
         <p:grpSpPr>
           <a:xfrm>
-            <a:off x="0" y="0"/>
-            <a:ext cx="10455259" cy="6858000"/>
-            <a:chOff x="0" y="0"/>
-            <a:chExt cx="10455259" cy="6858000"/>
+            <a:off x="385461" y="1625600"/>
+            <a:ext cx="9236059" cy="3283635"/>
+            <a:chOff x="385461" y="1625600"/>
+            <a:chExt cx="9236059" cy="3283635"/>
           </a:xfrm>
         </p:grpSpPr>
-        <p:pic>
-          <p:nvPicPr>
-            <p:cNvPr id="16" name="Picture 15" descr="A picture containing line, parallel, plot, number&#10;&#10;Description automatically generated">
+        <p:grpSp>
+          <p:nvGrpSpPr>
+            <p:cNvPr id="18" name="Group 17">
               <a:extLst>
                 <a:ext uri="{FF2B5EF4-FFF2-40B4-BE49-F238E27FC236}">
-                  <a16:creationId xmlns:a16="http://schemas.microsoft.com/office/drawing/2014/main" id="{12F0E329-2FC4-AB4A-9920-8E284A88999C}"/>
-                </a:ext>
-              </a:extLst>
-            </p:cNvPr>
-            <p:cNvPicPr>
-              <a:picLocks noChangeAspect="1"/>
-            </p:cNvPicPr>
-            <p:nvPr/>
-          </p:nvPicPr>
-          <p:blipFill>
-            <a:blip r:embed="rId2"/>
-            <a:stretch>
-              <a:fillRect/>
-            </a:stretch>
-          </p:blipFill>
-          <p:spPr>
-            <a:xfrm>
-              <a:off x="0" y="0"/>
-              <a:ext cx="10455259" cy="6858000"/>
-            </a:xfrm>
-            <a:prstGeom prst="rect">
-              <a:avLst/>
-            </a:prstGeom>
-          </p:spPr>
-        </p:pic>
-        <p:grpSp>
-          <p:nvGrpSpPr>
-            <p:cNvPr id="15" name="Group 14">
-              <a:extLst>
-                <a:ext uri="{FF2B5EF4-FFF2-40B4-BE49-F238E27FC236}">
-                  <a16:creationId xmlns:a16="http://schemas.microsoft.com/office/drawing/2014/main" id="{CD64E739-9382-9B44-AC9F-35FA0F386B97}"/>
+                  <a16:creationId xmlns:a16="http://schemas.microsoft.com/office/drawing/2014/main" id="{17149600-BE7F-2B4F-B971-63020196B6B6}"/>
                 </a:ext>
               </a:extLst>
             </p:cNvPr>
@@ -3557,18 +3473,18 @@
           </p:nvGrpSpPr>
           <p:grpSpPr>
             <a:xfrm>
-              <a:off x="2316480" y="1625600"/>
-              <a:ext cx="6075680" cy="3053080"/>
-              <a:chOff x="2316480" y="1625600"/>
-              <a:chExt cx="6075680" cy="3053080"/>
+              <a:off x="385461" y="1625600"/>
+              <a:ext cx="8006699" cy="2209800"/>
+              <a:chOff x="385461" y="1625600"/>
+              <a:chExt cx="8006699" cy="2209800"/>
             </a:xfrm>
           </p:grpSpPr>
           <p:grpSp>
             <p:nvGrpSpPr>
-              <p:cNvPr id="12" name="Group 11">
+              <p:cNvPr id="15" name="Group 14">
                 <a:extLst>
                   <a:ext uri="{FF2B5EF4-FFF2-40B4-BE49-F238E27FC236}">
-                    <a16:creationId xmlns:a16="http://schemas.microsoft.com/office/drawing/2014/main" id="{78CBB19F-B0B7-AB43-B719-1D65A945D745}"/>
+                    <a16:creationId xmlns:a16="http://schemas.microsoft.com/office/drawing/2014/main" id="{CD64E739-9382-9B44-AC9F-35FA0F386B97}"/>
                   </a:ext>
                 </a:extLst>
               </p:cNvPr>
@@ -3578,9 +3494,9 @@
             <p:grpSpPr>
               <a:xfrm>
                 <a:off x="2316480" y="1625600"/>
-                <a:ext cx="6075680" cy="3053080"/>
+                <a:ext cx="6075680" cy="1803400"/>
                 <a:chOff x="2316480" y="1625600"/>
-                <a:chExt cx="6075680" cy="3053080"/>
+                <a:chExt cx="6075680" cy="1803400"/>
               </a:xfrm>
             </p:grpSpPr>
             <p:grpSp>
@@ -3678,10 +3594,10 @@
             </p:grpSp>
             <p:sp>
               <p:nvSpPr>
-                <p:cNvPr id="11" name="TextBox 10">
+                <p:cNvPr id="14" name="TextBox 13">
                   <a:extLst>
                     <a:ext uri="{FF2B5EF4-FFF2-40B4-BE49-F238E27FC236}">
-                      <a16:creationId xmlns:a16="http://schemas.microsoft.com/office/drawing/2014/main" id="{7CE8DA8E-7933-1E40-BFC4-188217132C27}"/>
+                      <a16:creationId xmlns:a16="http://schemas.microsoft.com/office/drawing/2014/main" id="{96649892-200B-F741-8FDB-B75E9BAB3CC2}"/>
                     </a:ext>
                   </a:extLst>
                 </p:cNvPr>
@@ -3690,8 +3606,962 @@
               </p:nvSpPr>
               <p:spPr>
                 <a:xfrm>
-                  <a:off x="4765040" y="4032349"/>
-                  <a:ext cx="1219200" cy="646331"/>
+                  <a:off x="5547360" y="2355949"/>
+                  <a:ext cx="1351280" cy="646331"/>
+                </a:xfrm>
+                <a:prstGeom prst="rect">
+                  <a:avLst/>
+                </a:prstGeom>
+                <a:noFill/>
+              </p:spPr>
+              <p:txBody>
+                <a:bodyPr wrap="square" rtlCol="0">
+                  <a:spAutoFit/>
+                </a:bodyPr>
+                <a:lstStyle/>
+                <a:p>
+                  <a:pPr algn="ctr"/>
+                  <a:r>
+                    <a:rPr lang="en-US" b="1" dirty="0"/>
+                    <a:t>Person 4: (2.34, 1.67)</a:t>
+                  </a:r>
+                </a:p>
+              </p:txBody>
+            </p:sp>
+          </p:grpSp>
+          <p:sp>
+            <p:nvSpPr>
+              <p:cNvPr id="17" name="TextBox 16">
+                <a:extLst>
+                  <a:ext uri="{FF2B5EF4-FFF2-40B4-BE49-F238E27FC236}">
+                    <a16:creationId xmlns:a16="http://schemas.microsoft.com/office/drawing/2014/main" id="{C5BA62AD-587E-3C4D-A479-45F3413BAEDD}"/>
+                  </a:ext>
+                </a:extLst>
+              </p:cNvPr>
+              <p:cNvSpPr txBox="1"/>
+              <p:nvPr/>
+            </p:nvSpPr>
+            <p:spPr>
+              <a:xfrm>
+                <a:off x="385461" y="3189069"/>
+                <a:ext cx="1351280" cy="646331"/>
+              </a:xfrm>
+              <a:prstGeom prst="rect">
+                <a:avLst/>
+              </a:prstGeom>
+              <a:noFill/>
+            </p:spPr>
+            <p:txBody>
+              <a:bodyPr wrap="square" rtlCol="0">
+                <a:spAutoFit/>
+              </a:bodyPr>
+              <a:lstStyle/>
+              <a:p>
+                <a:pPr algn="ctr"/>
+                <a:r>
+                  <a:rPr lang="en-US" b="1" dirty="0"/>
+                  <a:t>Person 5: (0.21, 1.34)</a:t>
+                </a:r>
+              </a:p>
+            </p:txBody>
+          </p:sp>
+        </p:grpSp>
+        <p:sp>
+          <p:nvSpPr>
+            <p:cNvPr id="20" name="TextBox 19">
+              <a:extLst>
+                <a:ext uri="{FF2B5EF4-FFF2-40B4-BE49-F238E27FC236}">
+                  <a16:creationId xmlns:a16="http://schemas.microsoft.com/office/drawing/2014/main" id="{D6FDE777-8181-9443-9A2D-ADE17406E499}"/>
+                </a:ext>
+              </a:extLst>
+            </p:cNvPr>
+            <p:cNvSpPr txBox="1"/>
+            <p:nvPr/>
+          </p:nvSpPr>
+          <p:spPr>
+            <a:xfrm>
+              <a:off x="8300720" y="4262904"/>
+              <a:ext cx="1320800" cy="646331"/>
+            </a:xfrm>
+            <a:prstGeom prst="rect">
+              <a:avLst/>
+            </a:prstGeom>
+            <a:noFill/>
+          </p:spPr>
+          <p:txBody>
+            <a:bodyPr wrap="square" rtlCol="0">
+              <a:spAutoFit/>
+            </a:bodyPr>
+            <a:lstStyle/>
+            <a:p>
+              <a:pPr algn="ctr"/>
+              <a:r>
+                <a:rPr lang="en-US" b="1" dirty="0"/>
+                <a:t>Person 6: (3.49, 0.88)</a:t>
+              </a:r>
+            </a:p>
+          </p:txBody>
+        </p:sp>
+      </p:grpSp>
+    </p:spTree>
+    <p:extLst>
+      <p:ext uri="{BB962C8B-B14F-4D97-AF65-F5344CB8AC3E}">
+        <p14:creationId xmlns:p14="http://schemas.microsoft.com/office/powerpoint/2010/main" val="200430364"/>
+      </p:ext>
+    </p:extLst>
+  </p:cSld>
+  <p:clrMapOvr>
+    <a:masterClrMapping/>
+  </p:clrMapOvr>
+</p:sld>
+</file>
+
+<file path=ppt/slides/slide4.xml><?xml version="1.0" encoding="utf-8"?>
+<p:sld xmlns:a="http://schemas.openxmlformats.org/drawingml/2006/main" xmlns:r="http://schemas.openxmlformats.org/officeDocument/2006/relationships" xmlns:p="http://schemas.openxmlformats.org/presentationml/2006/main">
+  <p:cSld>
+    <p:spTree>
+      <p:nvGrpSpPr>
+        <p:cNvPr id="1" name=""/>
+        <p:cNvGrpSpPr/>
+        <p:nvPr/>
+      </p:nvGrpSpPr>
+      <p:grpSpPr>
+        <a:xfrm>
+          <a:off x="0" y="0"/>
+          <a:ext cx="0" cy="0"/>
+          <a:chOff x="0" y="0"/>
+          <a:chExt cx="0" cy="0"/>
+        </a:xfrm>
+      </p:grpSpPr>
+      <p:grpSp>
+        <p:nvGrpSpPr>
+          <p:cNvPr id="7" name="Group 6">
+            <a:extLst>
+              <a:ext uri="{FF2B5EF4-FFF2-40B4-BE49-F238E27FC236}">
+                <a16:creationId xmlns:a16="http://schemas.microsoft.com/office/drawing/2014/main" id="{B3385632-FF45-F244-AE32-F8808F10C6A8}"/>
+              </a:ext>
+            </a:extLst>
+          </p:cNvPr>
+          <p:cNvGrpSpPr/>
+          <p:nvPr/>
+        </p:nvGrpSpPr>
+        <p:grpSpPr>
+          <a:xfrm>
+            <a:off x="0" y="0"/>
+            <a:ext cx="10455259" cy="6858000"/>
+            <a:chOff x="0" y="0"/>
+            <a:chExt cx="10455259" cy="6858000"/>
+          </a:xfrm>
+        </p:grpSpPr>
+        <p:pic>
+          <p:nvPicPr>
+            <p:cNvPr id="23" name="Picture 22" descr="A picture containing line, plot, parallel, square&#10;&#10;Description automatically generated">
+              <a:extLst>
+                <a:ext uri="{FF2B5EF4-FFF2-40B4-BE49-F238E27FC236}">
+                  <a16:creationId xmlns:a16="http://schemas.microsoft.com/office/drawing/2014/main" id="{C8FF8352-E5B5-6749-8DBE-1FD975F8054E}"/>
+                </a:ext>
+              </a:extLst>
+            </p:cNvPr>
+            <p:cNvPicPr>
+              <a:picLocks noChangeAspect="1"/>
+            </p:cNvPicPr>
+            <p:nvPr/>
+          </p:nvPicPr>
+          <p:blipFill>
+            <a:blip r:embed="rId2"/>
+            <a:stretch>
+              <a:fillRect/>
+            </a:stretch>
+          </p:blipFill>
+          <p:spPr>
+            <a:xfrm>
+              <a:off x="0" y="0"/>
+              <a:ext cx="10455259" cy="6858000"/>
+            </a:xfrm>
+            <a:prstGeom prst="rect">
+              <a:avLst/>
+            </a:prstGeom>
+          </p:spPr>
+        </p:pic>
+        <p:sp>
+          <p:nvSpPr>
+            <p:cNvPr id="5" name="TextBox 4">
+              <a:extLst>
+                <a:ext uri="{FF2B5EF4-FFF2-40B4-BE49-F238E27FC236}">
+                  <a16:creationId xmlns:a16="http://schemas.microsoft.com/office/drawing/2014/main" id="{D172F9E8-4DA1-6042-9741-E8DA270C6FAA}"/>
+                </a:ext>
+              </a:extLst>
+            </p:cNvPr>
+            <p:cNvSpPr txBox="1"/>
+            <p:nvPr/>
+          </p:nvSpPr>
+          <p:spPr>
+            <a:xfrm>
+              <a:off x="7122160" y="1595120"/>
+              <a:ext cx="1351280" cy="646331"/>
+            </a:xfrm>
+            <a:prstGeom prst="rect">
+              <a:avLst/>
+            </a:prstGeom>
+            <a:noFill/>
+          </p:spPr>
+          <p:txBody>
+            <a:bodyPr wrap="square" rtlCol="0">
+              <a:spAutoFit/>
+            </a:bodyPr>
+            <a:lstStyle/>
+            <a:p>
+              <a:pPr algn="ctr"/>
+              <a:r>
+                <a:rPr lang="en-US" b="1" dirty="0"/>
+                <a:t>Person 1: (3, 2)</a:t>
+              </a:r>
+            </a:p>
+          </p:txBody>
+        </p:sp>
+        <p:sp>
+          <p:nvSpPr>
+            <p:cNvPr id="22" name="TextBox 21">
+              <a:extLst>
+                <a:ext uri="{FF2B5EF4-FFF2-40B4-BE49-F238E27FC236}">
+                  <a16:creationId xmlns:a16="http://schemas.microsoft.com/office/drawing/2014/main" id="{670EF1CB-49CE-514E-A7C6-FB09AD828D2A}"/>
+                </a:ext>
+              </a:extLst>
+            </p:cNvPr>
+            <p:cNvSpPr txBox="1"/>
+            <p:nvPr/>
+          </p:nvSpPr>
+          <p:spPr>
+            <a:xfrm>
+              <a:off x="2265680" y="2782669"/>
+              <a:ext cx="1351280" cy="646331"/>
+            </a:xfrm>
+            <a:prstGeom prst="rect">
+              <a:avLst/>
+            </a:prstGeom>
+            <a:noFill/>
+          </p:spPr>
+          <p:txBody>
+            <a:bodyPr wrap="square" rtlCol="0">
+              <a:spAutoFit/>
+            </a:bodyPr>
+            <a:lstStyle/>
+            <a:p>
+              <a:pPr algn="ctr"/>
+              <a:r>
+                <a:rPr lang="en-US" b="1" dirty="0"/>
+                <a:t>Person 2: (1, 1.5)</a:t>
+              </a:r>
+            </a:p>
+          </p:txBody>
+        </p:sp>
+      </p:grpSp>
+    </p:spTree>
+    <p:extLst>
+      <p:ext uri="{BB962C8B-B14F-4D97-AF65-F5344CB8AC3E}">
+        <p14:creationId xmlns:p14="http://schemas.microsoft.com/office/powerpoint/2010/main" val="433553971"/>
+      </p:ext>
+    </p:extLst>
+  </p:cSld>
+  <p:clrMapOvr>
+    <a:masterClrMapping/>
+  </p:clrMapOvr>
+</p:sld>
+</file>
+
+<file path=ppt/slides/slide5.xml><?xml version="1.0" encoding="utf-8"?>
+<p:sld xmlns:a="http://schemas.openxmlformats.org/drawingml/2006/main" xmlns:r="http://schemas.openxmlformats.org/officeDocument/2006/relationships" xmlns:p="http://schemas.openxmlformats.org/presentationml/2006/main">
+  <p:cSld>
+    <p:spTree>
+      <p:nvGrpSpPr>
+        <p:cNvPr id="1" name=""/>
+        <p:cNvGrpSpPr/>
+        <p:nvPr/>
+      </p:nvGrpSpPr>
+      <p:grpSpPr>
+        <a:xfrm>
+          <a:off x="0" y="0"/>
+          <a:ext cx="0" cy="0"/>
+          <a:chOff x="0" y="0"/>
+          <a:chExt cx="0" cy="0"/>
+        </a:xfrm>
+      </p:grpSpPr>
+      <p:grpSp>
+        <p:nvGrpSpPr>
+          <p:cNvPr id="2" name="Group 1">
+            <a:extLst>
+              <a:ext uri="{FF2B5EF4-FFF2-40B4-BE49-F238E27FC236}">
+                <a16:creationId xmlns:a16="http://schemas.microsoft.com/office/drawing/2014/main" id="{7BA514FC-AC68-304A-A3D6-08E5B16D54F1}"/>
+              </a:ext>
+            </a:extLst>
+          </p:cNvPr>
+          <p:cNvGrpSpPr/>
+          <p:nvPr/>
+        </p:nvGrpSpPr>
+        <p:grpSpPr>
+          <a:xfrm>
+            <a:off x="0" y="0"/>
+            <a:ext cx="10455259" cy="6858000"/>
+            <a:chOff x="0" y="0"/>
+            <a:chExt cx="10455259" cy="6858000"/>
+          </a:xfrm>
+        </p:grpSpPr>
+        <p:pic>
+          <p:nvPicPr>
+            <p:cNvPr id="6" name="Picture 5" descr="A picture containing line, plot, parallel, square&#10;&#10;Description automatically generated">
+              <a:extLst>
+                <a:ext uri="{FF2B5EF4-FFF2-40B4-BE49-F238E27FC236}">
+                  <a16:creationId xmlns:a16="http://schemas.microsoft.com/office/drawing/2014/main" id="{181D90A4-F977-6043-A71E-94208B7C6AC8}"/>
+                </a:ext>
+              </a:extLst>
+            </p:cNvPr>
+            <p:cNvPicPr>
+              <a:picLocks noChangeAspect="1"/>
+            </p:cNvPicPr>
+            <p:nvPr/>
+          </p:nvPicPr>
+          <p:blipFill>
+            <a:blip r:embed="rId2"/>
+            <a:stretch>
+              <a:fillRect/>
+            </a:stretch>
+          </p:blipFill>
+          <p:spPr>
+            <a:xfrm>
+              <a:off x="0" y="0"/>
+              <a:ext cx="10455259" cy="6858000"/>
+            </a:xfrm>
+            <a:prstGeom prst="rect">
+              <a:avLst/>
+            </a:prstGeom>
+          </p:spPr>
+        </p:pic>
+        <p:grpSp>
+          <p:nvGrpSpPr>
+            <p:cNvPr id="7" name="Group 6">
+              <a:extLst>
+                <a:ext uri="{FF2B5EF4-FFF2-40B4-BE49-F238E27FC236}">
+                  <a16:creationId xmlns:a16="http://schemas.microsoft.com/office/drawing/2014/main" id="{B3385632-FF45-F244-AE32-F8808F10C6A8}"/>
+                </a:ext>
+              </a:extLst>
+            </p:cNvPr>
+            <p:cNvGrpSpPr/>
+            <p:nvPr/>
+          </p:nvGrpSpPr>
+          <p:grpSpPr>
+            <a:xfrm>
+              <a:off x="2265680" y="1595120"/>
+              <a:ext cx="6207760" cy="1833880"/>
+              <a:chOff x="2265680" y="1595120"/>
+              <a:chExt cx="6207760" cy="1833880"/>
+            </a:xfrm>
+          </p:grpSpPr>
+          <p:sp>
+            <p:nvSpPr>
+              <p:cNvPr id="5" name="TextBox 4">
+                <a:extLst>
+                  <a:ext uri="{FF2B5EF4-FFF2-40B4-BE49-F238E27FC236}">
+                    <a16:creationId xmlns:a16="http://schemas.microsoft.com/office/drawing/2014/main" id="{D172F9E8-4DA1-6042-9741-E8DA270C6FAA}"/>
+                  </a:ext>
+                </a:extLst>
+              </p:cNvPr>
+              <p:cNvSpPr txBox="1"/>
+              <p:nvPr/>
+            </p:nvSpPr>
+            <p:spPr>
+              <a:xfrm>
+                <a:off x="7122160" y="1595120"/>
+                <a:ext cx="1351280" cy="646331"/>
+              </a:xfrm>
+              <a:prstGeom prst="rect">
+                <a:avLst/>
+              </a:prstGeom>
+              <a:noFill/>
+            </p:spPr>
+            <p:txBody>
+              <a:bodyPr wrap="square" rtlCol="0">
+                <a:spAutoFit/>
+              </a:bodyPr>
+              <a:lstStyle/>
+              <a:p>
+                <a:pPr algn="ctr"/>
+                <a:r>
+                  <a:rPr lang="en-US" b="1" dirty="0"/>
+                  <a:t>Person 1: (3, 2)</a:t>
+                </a:r>
+              </a:p>
+            </p:txBody>
+          </p:sp>
+          <p:sp>
+            <p:nvSpPr>
+              <p:cNvPr id="22" name="TextBox 21">
+                <a:extLst>
+                  <a:ext uri="{FF2B5EF4-FFF2-40B4-BE49-F238E27FC236}">
+                    <a16:creationId xmlns:a16="http://schemas.microsoft.com/office/drawing/2014/main" id="{670EF1CB-49CE-514E-A7C6-FB09AD828D2A}"/>
+                  </a:ext>
+                </a:extLst>
+              </p:cNvPr>
+              <p:cNvSpPr txBox="1"/>
+              <p:nvPr/>
+            </p:nvSpPr>
+            <p:spPr>
+              <a:xfrm>
+                <a:off x="2265680" y="2782669"/>
+                <a:ext cx="1351280" cy="646331"/>
+              </a:xfrm>
+              <a:prstGeom prst="rect">
+                <a:avLst/>
+              </a:prstGeom>
+              <a:noFill/>
+            </p:spPr>
+            <p:txBody>
+              <a:bodyPr wrap="square" rtlCol="0">
+                <a:spAutoFit/>
+              </a:bodyPr>
+              <a:lstStyle/>
+              <a:p>
+                <a:pPr algn="ctr"/>
+                <a:r>
+                  <a:rPr lang="en-US" b="1" dirty="0"/>
+                  <a:t>Person 2: (1, 1.5)</a:t>
+                </a:r>
+              </a:p>
+            </p:txBody>
+          </p:sp>
+        </p:grpSp>
+        <p:sp>
+          <p:nvSpPr>
+            <p:cNvPr id="8" name="TextBox 7">
+              <a:extLst>
+                <a:ext uri="{FF2B5EF4-FFF2-40B4-BE49-F238E27FC236}">
+                  <a16:creationId xmlns:a16="http://schemas.microsoft.com/office/drawing/2014/main" id="{5944F8AC-F337-4D45-AFFC-9197441D974F}"/>
+                </a:ext>
+              </a:extLst>
+            </p:cNvPr>
+            <p:cNvSpPr txBox="1"/>
+            <p:nvPr/>
+          </p:nvSpPr>
+          <p:spPr>
+            <a:xfrm>
+              <a:off x="4744720" y="4001869"/>
+              <a:ext cx="1330960" cy="646331"/>
+            </a:xfrm>
+            <a:prstGeom prst="rect">
+              <a:avLst/>
+            </a:prstGeom>
+            <a:noFill/>
+          </p:spPr>
+          <p:txBody>
+            <a:bodyPr wrap="square" rtlCol="0">
+              <a:spAutoFit/>
+            </a:bodyPr>
+            <a:lstStyle/>
+            <a:p>
+              <a:pPr algn="ctr"/>
+              <a:r>
+                <a:rPr lang="en-US" b="1" dirty="0"/>
+                <a:t>Person 3: (2, 1)</a:t>
+              </a:r>
+            </a:p>
+          </p:txBody>
+        </p:sp>
+      </p:grpSp>
+    </p:spTree>
+    <p:extLst>
+      <p:ext uri="{BB962C8B-B14F-4D97-AF65-F5344CB8AC3E}">
+        <p14:creationId xmlns:p14="http://schemas.microsoft.com/office/powerpoint/2010/main" val="253520395"/>
+      </p:ext>
+    </p:extLst>
+  </p:cSld>
+  <p:clrMapOvr>
+    <a:masterClrMapping/>
+  </p:clrMapOvr>
+</p:sld>
+</file>
+
+<file path=ppt/slides/slide6.xml><?xml version="1.0" encoding="utf-8"?>
+<p:sld xmlns:a="http://schemas.openxmlformats.org/drawingml/2006/main" xmlns:r="http://schemas.openxmlformats.org/officeDocument/2006/relationships" xmlns:p="http://schemas.openxmlformats.org/presentationml/2006/main">
+  <p:cSld>
+    <p:spTree>
+      <p:nvGrpSpPr>
+        <p:cNvPr id="1" name=""/>
+        <p:cNvGrpSpPr/>
+        <p:nvPr/>
+      </p:nvGrpSpPr>
+      <p:grpSpPr>
+        <a:xfrm>
+          <a:off x="0" y="0"/>
+          <a:ext cx="0" cy="0"/>
+          <a:chOff x="0" y="0"/>
+          <a:chExt cx="0" cy="0"/>
+        </a:xfrm>
+      </p:grpSpPr>
+      <p:grpSp>
+        <p:nvGrpSpPr>
+          <p:cNvPr id="3" name="Group 2">
+            <a:extLst>
+              <a:ext uri="{FF2B5EF4-FFF2-40B4-BE49-F238E27FC236}">
+                <a16:creationId xmlns:a16="http://schemas.microsoft.com/office/drawing/2014/main" id="{CA9C4F6C-056C-8841-BF44-5B258063E882}"/>
+              </a:ext>
+            </a:extLst>
+          </p:cNvPr>
+          <p:cNvGrpSpPr/>
+          <p:nvPr/>
+        </p:nvGrpSpPr>
+        <p:grpSpPr>
+          <a:xfrm>
+            <a:off x="0" y="0"/>
+            <a:ext cx="10455259" cy="6858000"/>
+            <a:chOff x="0" y="0"/>
+            <a:chExt cx="10455259" cy="6858000"/>
+          </a:xfrm>
+        </p:grpSpPr>
+        <p:pic>
+          <p:nvPicPr>
+            <p:cNvPr id="9" name="Picture 8" descr="A picture containing line, plot, parallel, screenshot&#10;&#10;Description automatically generated">
+              <a:extLst>
+                <a:ext uri="{FF2B5EF4-FFF2-40B4-BE49-F238E27FC236}">
+                  <a16:creationId xmlns:a16="http://schemas.microsoft.com/office/drawing/2014/main" id="{D8FC5E66-753E-2C47-8B2C-C3C0029E1006}"/>
+                </a:ext>
+              </a:extLst>
+            </p:cNvPr>
+            <p:cNvPicPr>
+              <a:picLocks noChangeAspect="1"/>
+            </p:cNvPicPr>
+            <p:nvPr/>
+          </p:nvPicPr>
+          <p:blipFill>
+            <a:blip r:embed="rId2"/>
+            <a:stretch>
+              <a:fillRect/>
+            </a:stretch>
+          </p:blipFill>
+          <p:spPr>
+            <a:xfrm>
+              <a:off x="0" y="0"/>
+              <a:ext cx="10455259" cy="6858000"/>
+            </a:xfrm>
+            <a:prstGeom prst="rect">
+              <a:avLst/>
+            </a:prstGeom>
+          </p:spPr>
+        </p:pic>
+        <p:grpSp>
+          <p:nvGrpSpPr>
+            <p:cNvPr id="2" name="Group 1">
+              <a:extLst>
+                <a:ext uri="{FF2B5EF4-FFF2-40B4-BE49-F238E27FC236}">
+                  <a16:creationId xmlns:a16="http://schemas.microsoft.com/office/drawing/2014/main" id="{7BA514FC-AC68-304A-A3D6-08E5B16D54F1}"/>
+                </a:ext>
+              </a:extLst>
+            </p:cNvPr>
+            <p:cNvGrpSpPr/>
+            <p:nvPr/>
+          </p:nvGrpSpPr>
+          <p:grpSpPr>
+            <a:xfrm>
+              <a:off x="2265680" y="1595120"/>
+              <a:ext cx="6207760" cy="3053080"/>
+              <a:chOff x="2265680" y="1595120"/>
+              <a:chExt cx="6207760" cy="3053080"/>
+            </a:xfrm>
+          </p:grpSpPr>
+          <p:grpSp>
+            <p:nvGrpSpPr>
+              <p:cNvPr id="7" name="Group 6">
+                <a:extLst>
+                  <a:ext uri="{FF2B5EF4-FFF2-40B4-BE49-F238E27FC236}">
+                    <a16:creationId xmlns:a16="http://schemas.microsoft.com/office/drawing/2014/main" id="{B3385632-FF45-F244-AE32-F8808F10C6A8}"/>
+                  </a:ext>
+                </a:extLst>
+              </p:cNvPr>
+              <p:cNvGrpSpPr/>
+              <p:nvPr/>
+            </p:nvGrpSpPr>
+            <p:grpSpPr>
+              <a:xfrm>
+                <a:off x="2265680" y="1595120"/>
+                <a:ext cx="6207760" cy="1833880"/>
+                <a:chOff x="2265680" y="1595120"/>
+                <a:chExt cx="6207760" cy="1833880"/>
+              </a:xfrm>
+            </p:grpSpPr>
+            <p:sp>
+              <p:nvSpPr>
+                <p:cNvPr id="5" name="TextBox 4">
+                  <a:extLst>
+                    <a:ext uri="{FF2B5EF4-FFF2-40B4-BE49-F238E27FC236}">
+                      <a16:creationId xmlns:a16="http://schemas.microsoft.com/office/drawing/2014/main" id="{D172F9E8-4DA1-6042-9741-E8DA270C6FAA}"/>
+                    </a:ext>
+                  </a:extLst>
+                </p:cNvPr>
+                <p:cNvSpPr txBox="1"/>
+                <p:nvPr/>
+              </p:nvSpPr>
+              <p:spPr>
+                <a:xfrm>
+                  <a:off x="7122160" y="1595120"/>
+                  <a:ext cx="1351280" cy="646331"/>
+                </a:xfrm>
+                <a:prstGeom prst="rect">
+                  <a:avLst/>
+                </a:prstGeom>
+                <a:noFill/>
+              </p:spPr>
+              <p:txBody>
+                <a:bodyPr wrap="square" rtlCol="0">
+                  <a:spAutoFit/>
+                </a:bodyPr>
+                <a:lstStyle/>
+                <a:p>
+                  <a:pPr algn="ctr"/>
+                  <a:r>
+                    <a:rPr lang="en-US" b="1" dirty="0"/>
+                    <a:t>Person 1: (3, 2)</a:t>
+                  </a:r>
+                </a:p>
+              </p:txBody>
+            </p:sp>
+            <p:sp>
+              <p:nvSpPr>
+                <p:cNvPr id="22" name="TextBox 21">
+                  <a:extLst>
+                    <a:ext uri="{FF2B5EF4-FFF2-40B4-BE49-F238E27FC236}">
+                      <a16:creationId xmlns:a16="http://schemas.microsoft.com/office/drawing/2014/main" id="{670EF1CB-49CE-514E-A7C6-FB09AD828D2A}"/>
+                    </a:ext>
+                  </a:extLst>
+                </p:cNvPr>
+                <p:cNvSpPr txBox="1"/>
+                <p:nvPr/>
+              </p:nvSpPr>
+              <p:spPr>
+                <a:xfrm>
+                  <a:off x="2265680" y="2782669"/>
+                  <a:ext cx="1351280" cy="646331"/>
+                </a:xfrm>
+                <a:prstGeom prst="rect">
+                  <a:avLst/>
+                </a:prstGeom>
+                <a:noFill/>
+              </p:spPr>
+              <p:txBody>
+                <a:bodyPr wrap="square" rtlCol="0">
+                  <a:spAutoFit/>
+                </a:bodyPr>
+                <a:lstStyle/>
+                <a:p>
+                  <a:pPr algn="ctr"/>
+                  <a:r>
+                    <a:rPr lang="en-US" b="1" dirty="0"/>
+                    <a:t>Person 2: (1, 1.5)</a:t>
+                  </a:r>
+                </a:p>
+              </p:txBody>
+            </p:sp>
+          </p:grpSp>
+          <p:sp>
+            <p:nvSpPr>
+              <p:cNvPr id="8" name="TextBox 7">
+                <a:extLst>
+                  <a:ext uri="{FF2B5EF4-FFF2-40B4-BE49-F238E27FC236}">
+                    <a16:creationId xmlns:a16="http://schemas.microsoft.com/office/drawing/2014/main" id="{5944F8AC-F337-4D45-AFFC-9197441D974F}"/>
+                  </a:ext>
+                </a:extLst>
+              </p:cNvPr>
+              <p:cNvSpPr txBox="1"/>
+              <p:nvPr/>
+            </p:nvSpPr>
+            <p:spPr>
+              <a:xfrm>
+                <a:off x="4744720" y="4001869"/>
+                <a:ext cx="1330960" cy="646331"/>
+              </a:xfrm>
+              <a:prstGeom prst="rect">
+                <a:avLst/>
+              </a:prstGeom>
+              <a:noFill/>
+            </p:spPr>
+            <p:txBody>
+              <a:bodyPr wrap="square" rtlCol="0">
+                <a:spAutoFit/>
+              </a:bodyPr>
+              <a:lstStyle/>
+              <a:p>
+                <a:pPr algn="ctr"/>
+                <a:r>
+                  <a:rPr lang="en-US" b="1" dirty="0"/>
+                  <a:t>Person 3: (2, 1)</a:t>
+                </a:r>
+              </a:p>
+            </p:txBody>
+          </p:sp>
+        </p:grpSp>
+        <p:sp>
+          <p:nvSpPr>
+            <p:cNvPr id="10" name="TextBox 9">
+              <a:extLst>
+                <a:ext uri="{FF2B5EF4-FFF2-40B4-BE49-F238E27FC236}">
+                  <a16:creationId xmlns:a16="http://schemas.microsoft.com/office/drawing/2014/main" id="{A6B0FE71-0FDE-114E-93C4-3AE115AE9FC1}"/>
+                </a:ext>
+              </a:extLst>
+            </p:cNvPr>
+            <p:cNvSpPr txBox="1"/>
+            <p:nvPr/>
+          </p:nvSpPr>
+          <p:spPr>
+            <a:xfrm>
+              <a:off x="5537200" y="2355949"/>
+              <a:ext cx="1351280" cy="646331"/>
+            </a:xfrm>
+            <a:prstGeom prst="rect">
+              <a:avLst/>
+            </a:prstGeom>
+            <a:noFill/>
+          </p:spPr>
+          <p:txBody>
+            <a:bodyPr wrap="square" rtlCol="0">
+              <a:spAutoFit/>
+            </a:bodyPr>
+            <a:lstStyle/>
+            <a:p>
+              <a:pPr algn="ctr"/>
+              <a:r>
+                <a:rPr lang="en-US" b="1" dirty="0"/>
+                <a:t>Person 4: (2.34, 1.67)</a:t>
+              </a:r>
+            </a:p>
+          </p:txBody>
+        </p:sp>
+      </p:grpSp>
+    </p:spTree>
+    <p:extLst>
+      <p:ext uri="{BB962C8B-B14F-4D97-AF65-F5344CB8AC3E}">
+        <p14:creationId xmlns:p14="http://schemas.microsoft.com/office/powerpoint/2010/main" val="1652742137"/>
+      </p:ext>
+    </p:extLst>
+  </p:cSld>
+  <p:clrMapOvr>
+    <a:masterClrMapping/>
+  </p:clrMapOvr>
+</p:sld>
+</file>
+
+<file path=ppt/slides/slide7.xml><?xml version="1.0" encoding="utf-8"?>
+<p:sld xmlns:a="http://schemas.openxmlformats.org/drawingml/2006/main" xmlns:r="http://schemas.openxmlformats.org/officeDocument/2006/relationships" xmlns:p="http://schemas.openxmlformats.org/presentationml/2006/main">
+  <p:cSld>
+    <p:spTree>
+      <p:nvGrpSpPr>
+        <p:cNvPr id="1" name=""/>
+        <p:cNvGrpSpPr/>
+        <p:nvPr/>
+      </p:nvGrpSpPr>
+      <p:grpSpPr>
+        <a:xfrm>
+          <a:off x="0" y="0"/>
+          <a:ext cx="0" cy="0"/>
+          <a:chOff x="0" y="0"/>
+          <a:chExt cx="0" cy="0"/>
+        </a:xfrm>
+      </p:grpSpPr>
+      <p:grpSp>
+        <p:nvGrpSpPr>
+          <p:cNvPr id="4" name="Group 3">
+            <a:extLst>
+              <a:ext uri="{FF2B5EF4-FFF2-40B4-BE49-F238E27FC236}">
+                <a16:creationId xmlns:a16="http://schemas.microsoft.com/office/drawing/2014/main" id="{531B3B4C-629B-4747-AE09-AC99BC678637}"/>
+              </a:ext>
+            </a:extLst>
+          </p:cNvPr>
+          <p:cNvGrpSpPr/>
+          <p:nvPr/>
+        </p:nvGrpSpPr>
+        <p:grpSpPr>
+          <a:xfrm>
+            <a:off x="0" y="0"/>
+            <a:ext cx="10455259" cy="6858000"/>
+            <a:chOff x="0" y="0"/>
+            <a:chExt cx="10455259" cy="6858000"/>
+          </a:xfrm>
+        </p:grpSpPr>
+        <p:pic>
+          <p:nvPicPr>
+            <p:cNvPr id="12" name="Picture 11" descr="A picture containing line, parallel, plot, number&#10;&#10;Description automatically generated">
+              <a:extLst>
+                <a:ext uri="{FF2B5EF4-FFF2-40B4-BE49-F238E27FC236}">
+                  <a16:creationId xmlns:a16="http://schemas.microsoft.com/office/drawing/2014/main" id="{8975C3C5-AC59-8340-811C-0216436E9AAC}"/>
+                </a:ext>
+              </a:extLst>
+            </p:cNvPr>
+            <p:cNvPicPr>
+              <a:picLocks noChangeAspect="1"/>
+            </p:cNvPicPr>
+            <p:nvPr/>
+          </p:nvPicPr>
+          <p:blipFill>
+            <a:blip r:embed="rId2"/>
+            <a:stretch>
+              <a:fillRect/>
+            </a:stretch>
+          </p:blipFill>
+          <p:spPr>
+            <a:xfrm>
+              <a:off x="0" y="0"/>
+              <a:ext cx="10455259" cy="6858000"/>
+            </a:xfrm>
+            <a:prstGeom prst="rect">
+              <a:avLst/>
+            </a:prstGeom>
+          </p:spPr>
+        </p:pic>
+        <p:grpSp>
+          <p:nvGrpSpPr>
+            <p:cNvPr id="3" name="Group 2">
+              <a:extLst>
+                <a:ext uri="{FF2B5EF4-FFF2-40B4-BE49-F238E27FC236}">
+                  <a16:creationId xmlns:a16="http://schemas.microsoft.com/office/drawing/2014/main" id="{CA9C4F6C-056C-8841-BF44-5B258063E882}"/>
+                </a:ext>
+              </a:extLst>
+            </p:cNvPr>
+            <p:cNvGrpSpPr/>
+            <p:nvPr/>
+          </p:nvGrpSpPr>
+          <p:grpSpPr>
+            <a:xfrm>
+              <a:off x="2265680" y="1595120"/>
+              <a:ext cx="6207760" cy="3053080"/>
+              <a:chOff x="2265680" y="1595120"/>
+              <a:chExt cx="6207760" cy="3053080"/>
+            </a:xfrm>
+          </p:grpSpPr>
+          <p:grpSp>
+            <p:nvGrpSpPr>
+              <p:cNvPr id="2" name="Group 1">
+                <a:extLst>
+                  <a:ext uri="{FF2B5EF4-FFF2-40B4-BE49-F238E27FC236}">
+                    <a16:creationId xmlns:a16="http://schemas.microsoft.com/office/drawing/2014/main" id="{7BA514FC-AC68-304A-A3D6-08E5B16D54F1}"/>
+                  </a:ext>
+                </a:extLst>
+              </p:cNvPr>
+              <p:cNvGrpSpPr/>
+              <p:nvPr/>
+            </p:nvGrpSpPr>
+            <p:grpSpPr>
+              <a:xfrm>
+                <a:off x="2265680" y="1595120"/>
+                <a:ext cx="6207760" cy="3053080"/>
+                <a:chOff x="2265680" y="1595120"/>
+                <a:chExt cx="6207760" cy="3053080"/>
+              </a:xfrm>
+            </p:grpSpPr>
+            <p:grpSp>
+              <p:nvGrpSpPr>
+                <p:cNvPr id="7" name="Group 6">
+                  <a:extLst>
+                    <a:ext uri="{FF2B5EF4-FFF2-40B4-BE49-F238E27FC236}">
+                      <a16:creationId xmlns:a16="http://schemas.microsoft.com/office/drawing/2014/main" id="{B3385632-FF45-F244-AE32-F8808F10C6A8}"/>
+                    </a:ext>
+                  </a:extLst>
+                </p:cNvPr>
+                <p:cNvGrpSpPr/>
+                <p:nvPr/>
+              </p:nvGrpSpPr>
+              <p:grpSpPr>
+                <a:xfrm>
+                  <a:off x="2265680" y="1595120"/>
+                  <a:ext cx="6207760" cy="1833880"/>
+                  <a:chOff x="2265680" y="1595120"/>
+                  <a:chExt cx="6207760" cy="1833880"/>
+                </a:xfrm>
+              </p:grpSpPr>
+              <p:sp>
+                <p:nvSpPr>
+                  <p:cNvPr id="5" name="TextBox 4">
+                    <a:extLst>
+                      <a:ext uri="{FF2B5EF4-FFF2-40B4-BE49-F238E27FC236}">
+                        <a16:creationId xmlns:a16="http://schemas.microsoft.com/office/drawing/2014/main" id="{D172F9E8-4DA1-6042-9741-E8DA270C6FAA}"/>
+                      </a:ext>
+                    </a:extLst>
+                  </p:cNvPr>
+                  <p:cNvSpPr txBox="1"/>
+                  <p:nvPr/>
+                </p:nvSpPr>
+                <p:spPr>
+                  <a:xfrm>
+                    <a:off x="7122160" y="1595120"/>
+                    <a:ext cx="1351280" cy="646331"/>
+                  </a:xfrm>
+                  <a:prstGeom prst="rect">
+                    <a:avLst/>
+                  </a:prstGeom>
+                  <a:noFill/>
+                </p:spPr>
+                <p:txBody>
+                  <a:bodyPr wrap="square" rtlCol="0">
+                    <a:spAutoFit/>
+                  </a:bodyPr>
+                  <a:lstStyle/>
+                  <a:p>
+                    <a:pPr algn="ctr"/>
+                    <a:r>
+                      <a:rPr lang="en-US" b="1" dirty="0"/>
+                      <a:t>Person 1: (3, 2)</a:t>
+                    </a:r>
+                  </a:p>
+                </p:txBody>
+              </p:sp>
+              <p:sp>
+                <p:nvSpPr>
+                  <p:cNvPr id="22" name="TextBox 21">
+                    <a:extLst>
+                      <a:ext uri="{FF2B5EF4-FFF2-40B4-BE49-F238E27FC236}">
+                        <a16:creationId xmlns:a16="http://schemas.microsoft.com/office/drawing/2014/main" id="{670EF1CB-49CE-514E-A7C6-FB09AD828D2A}"/>
+                      </a:ext>
+                    </a:extLst>
+                  </p:cNvPr>
+                  <p:cNvSpPr txBox="1"/>
+                  <p:nvPr/>
+                </p:nvSpPr>
+                <p:spPr>
+                  <a:xfrm>
+                    <a:off x="2265680" y="2782669"/>
+                    <a:ext cx="1351280" cy="646331"/>
+                  </a:xfrm>
+                  <a:prstGeom prst="rect">
+                    <a:avLst/>
+                  </a:prstGeom>
+                  <a:noFill/>
+                </p:spPr>
+                <p:txBody>
+                  <a:bodyPr wrap="square" rtlCol="0">
+                    <a:spAutoFit/>
+                  </a:bodyPr>
+                  <a:lstStyle/>
+                  <a:p>
+                    <a:pPr algn="ctr"/>
+                    <a:r>
+                      <a:rPr lang="en-US" b="1" dirty="0"/>
+                      <a:t>Person 2: (1, 1.5)</a:t>
+                    </a:r>
+                  </a:p>
+                </p:txBody>
+              </p:sp>
+            </p:grpSp>
+            <p:sp>
+              <p:nvSpPr>
+                <p:cNvPr id="8" name="TextBox 7">
+                  <a:extLst>
+                    <a:ext uri="{FF2B5EF4-FFF2-40B4-BE49-F238E27FC236}">
+                      <a16:creationId xmlns:a16="http://schemas.microsoft.com/office/drawing/2014/main" id="{5944F8AC-F337-4D45-AFFC-9197441D974F}"/>
+                    </a:ext>
+                  </a:extLst>
+                </p:cNvPr>
+                <p:cNvSpPr txBox="1"/>
+                <p:nvPr/>
+              </p:nvSpPr>
+              <p:spPr>
+                <a:xfrm>
+                  <a:off x="4744720" y="4001869"/>
+                  <a:ext cx="1330960" cy="646331"/>
                 </a:xfrm>
                 <a:prstGeom prst="rect">
                   <a:avLst/>
@@ -3715,10 +4585,10 @@
           </p:grpSp>
           <p:sp>
             <p:nvSpPr>
-              <p:cNvPr id="14" name="TextBox 13">
+              <p:cNvPr id="10" name="TextBox 9">
                 <a:extLst>
                   <a:ext uri="{FF2B5EF4-FFF2-40B4-BE49-F238E27FC236}">
-                    <a16:creationId xmlns:a16="http://schemas.microsoft.com/office/drawing/2014/main" id="{96649892-200B-F741-8FDB-B75E9BAB3CC2}"/>
+                    <a16:creationId xmlns:a16="http://schemas.microsoft.com/office/drawing/2014/main" id="{A6B0FE71-0FDE-114E-93C4-3AE115AE9FC1}"/>
                   </a:ext>
                 </a:extLst>
               </p:cNvPr>
@@ -3727,7 +4597,7 @@
             </p:nvSpPr>
             <p:spPr>
               <a:xfrm>
-                <a:off x="5547360" y="2355949"/>
+                <a:off x="5537200" y="2355949"/>
                 <a:ext cx="1351280" cy="646331"/>
               </a:xfrm>
               <a:prstGeom prst="rect">
@@ -3752,10 +4622,10 @@
         </p:grpSp>
         <p:sp>
           <p:nvSpPr>
-            <p:cNvPr id="17" name="TextBox 16">
+            <p:cNvPr id="11" name="TextBox 10">
               <a:extLst>
                 <a:ext uri="{FF2B5EF4-FFF2-40B4-BE49-F238E27FC236}">
-                  <a16:creationId xmlns:a16="http://schemas.microsoft.com/office/drawing/2014/main" id="{C5BA62AD-587E-3C4D-A479-45F3413BAEDD}"/>
+                  <a16:creationId xmlns:a16="http://schemas.microsoft.com/office/drawing/2014/main" id="{83C3A677-F843-B740-BE28-9A6F0DC99962}"/>
                 </a:ext>
               </a:extLst>
             </p:cNvPr>
@@ -3790,7 +4660,847 @@
     </p:spTree>
     <p:extLst>
       <p:ext uri="{BB962C8B-B14F-4D97-AF65-F5344CB8AC3E}">
-        <p14:creationId xmlns:p14="http://schemas.microsoft.com/office/powerpoint/2010/main" val="200430364"/>
+        <p14:creationId xmlns:p14="http://schemas.microsoft.com/office/powerpoint/2010/main" val="4135668919"/>
+      </p:ext>
+    </p:extLst>
+  </p:cSld>
+  <p:clrMapOvr>
+    <a:masterClrMapping/>
+  </p:clrMapOvr>
+</p:sld>
+</file>
+
+<file path=ppt/slides/slide8.xml><?xml version="1.0" encoding="utf-8"?>
+<p:sld xmlns:a="http://schemas.openxmlformats.org/drawingml/2006/main" xmlns:r="http://schemas.openxmlformats.org/officeDocument/2006/relationships" xmlns:p="http://schemas.openxmlformats.org/presentationml/2006/main">
+  <p:cSld>
+    <p:spTree>
+      <p:nvGrpSpPr>
+        <p:cNvPr id="1" name=""/>
+        <p:cNvGrpSpPr/>
+        <p:nvPr/>
+      </p:nvGrpSpPr>
+      <p:grpSpPr>
+        <a:xfrm>
+          <a:off x="0" y="0"/>
+          <a:ext cx="0" cy="0"/>
+          <a:chOff x="0" y="0"/>
+          <a:chExt cx="0" cy="0"/>
+        </a:xfrm>
+      </p:grpSpPr>
+      <p:grpSp>
+        <p:nvGrpSpPr>
+          <p:cNvPr id="18" name="Group 17">
+            <a:extLst>
+              <a:ext uri="{FF2B5EF4-FFF2-40B4-BE49-F238E27FC236}">
+                <a16:creationId xmlns:a16="http://schemas.microsoft.com/office/drawing/2014/main" id="{4340DE58-4307-6344-A5F3-9A853D48139A}"/>
+              </a:ext>
+            </a:extLst>
+          </p:cNvPr>
+          <p:cNvGrpSpPr/>
+          <p:nvPr/>
+        </p:nvGrpSpPr>
+        <p:grpSpPr>
+          <a:xfrm>
+            <a:off x="0" y="0"/>
+            <a:ext cx="10455259" cy="6858000"/>
+            <a:chOff x="0" y="0"/>
+            <a:chExt cx="10455259" cy="6858000"/>
+          </a:xfrm>
+        </p:grpSpPr>
+        <p:pic>
+          <p:nvPicPr>
+            <p:cNvPr id="17" name="Picture 16" descr="A picture containing line, parallel, plot, number&#10;&#10;Description automatically generated">
+              <a:extLst>
+                <a:ext uri="{FF2B5EF4-FFF2-40B4-BE49-F238E27FC236}">
+                  <a16:creationId xmlns:a16="http://schemas.microsoft.com/office/drawing/2014/main" id="{C029308A-50A6-5F40-95D0-7238F4D3FF34}"/>
+                </a:ext>
+              </a:extLst>
+            </p:cNvPr>
+            <p:cNvPicPr>
+              <a:picLocks noChangeAspect="1"/>
+            </p:cNvPicPr>
+            <p:nvPr/>
+          </p:nvPicPr>
+          <p:blipFill>
+            <a:blip r:embed="rId2"/>
+            <a:stretch>
+              <a:fillRect/>
+            </a:stretch>
+          </p:blipFill>
+          <p:spPr>
+            <a:xfrm>
+              <a:off x="0" y="0"/>
+              <a:ext cx="10455259" cy="6858000"/>
+            </a:xfrm>
+            <a:prstGeom prst="rect">
+              <a:avLst/>
+            </a:prstGeom>
+          </p:spPr>
+        </p:pic>
+        <p:grpSp>
+          <p:nvGrpSpPr>
+            <p:cNvPr id="6" name="Group 5">
+              <a:extLst>
+                <a:ext uri="{FF2B5EF4-FFF2-40B4-BE49-F238E27FC236}">
+                  <a16:creationId xmlns:a16="http://schemas.microsoft.com/office/drawing/2014/main" id="{A9634F24-4618-EA4C-85AD-DE0D7C49A86C}"/>
+                </a:ext>
+              </a:extLst>
+            </p:cNvPr>
+            <p:cNvGrpSpPr/>
+            <p:nvPr/>
+          </p:nvGrpSpPr>
+          <p:grpSpPr>
+            <a:xfrm>
+              <a:off x="385461" y="1595120"/>
+              <a:ext cx="9388459" cy="3283635"/>
+              <a:chOff x="385461" y="1595120"/>
+              <a:chExt cx="9388459" cy="3283635"/>
+            </a:xfrm>
+          </p:grpSpPr>
+          <p:grpSp>
+            <p:nvGrpSpPr>
+              <p:cNvPr id="4" name="Group 3">
+                <a:extLst>
+                  <a:ext uri="{FF2B5EF4-FFF2-40B4-BE49-F238E27FC236}">
+                    <a16:creationId xmlns:a16="http://schemas.microsoft.com/office/drawing/2014/main" id="{531B3B4C-629B-4747-AE09-AC99BC678637}"/>
+                  </a:ext>
+                </a:extLst>
+              </p:cNvPr>
+              <p:cNvGrpSpPr/>
+              <p:nvPr/>
+            </p:nvGrpSpPr>
+            <p:grpSpPr>
+              <a:xfrm>
+                <a:off x="385461" y="1595120"/>
+                <a:ext cx="8087979" cy="3053080"/>
+                <a:chOff x="385461" y="1595120"/>
+                <a:chExt cx="8087979" cy="3053080"/>
+              </a:xfrm>
+            </p:grpSpPr>
+            <p:grpSp>
+              <p:nvGrpSpPr>
+                <p:cNvPr id="3" name="Group 2">
+                  <a:extLst>
+                    <a:ext uri="{FF2B5EF4-FFF2-40B4-BE49-F238E27FC236}">
+                      <a16:creationId xmlns:a16="http://schemas.microsoft.com/office/drawing/2014/main" id="{CA9C4F6C-056C-8841-BF44-5B258063E882}"/>
+                    </a:ext>
+                  </a:extLst>
+                </p:cNvPr>
+                <p:cNvGrpSpPr/>
+                <p:nvPr/>
+              </p:nvGrpSpPr>
+              <p:grpSpPr>
+                <a:xfrm>
+                  <a:off x="2265680" y="1595120"/>
+                  <a:ext cx="6207760" cy="3053080"/>
+                  <a:chOff x="2265680" y="1595120"/>
+                  <a:chExt cx="6207760" cy="3053080"/>
+                </a:xfrm>
+              </p:grpSpPr>
+              <p:grpSp>
+                <p:nvGrpSpPr>
+                  <p:cNvPr id="2" name="Group 1">
+                    <a:extLst>
+                      <a:ext uri="{FF2B5EF4-FFF2-40B4-BE49-F238E27FC236}">
+                        <a16:creationId xmlns:a16="http://schemas.microsoft.com/office/drawing/2014/main" id="{7BA514FC-AC68-304A-A3D6-08E5B16D54F1}"/>
+                      </a:ext>
+                    </a:extLst>
+                  </p:cNvPr>
+                  <p:cNvGrpSpPr/>
+                  <p:nvPr/>
+                </p:nvGrpSpPr>
+                <p:grpSpPr>
+                  <a:xfrm>
+                    <a:off x="2265680" y="1595120"/>
+                    <a:ext cx="6207760" cy="3053080"/>
+                    <a:chOff x="2265680" y="1595120"/>
+                    <a:chExt cx="6207760" cy="3053080"/>
+                  </a:xfrm>
+                </p:grpSpPr>
+                <p:grpSp>
+                  <p:nvGrpSpPr>
+                    <p:cNvPr id="7" name="Group 6">
+                      <a:extLst>
+                        <a:ext uri="{FF2B5EF4-FFF2-40B4-BE49-F238E27FC236}">
+                          <a16:creationId xmlns:a16="http://schemas.microsoft.com/office/drawing/2014/main" id="{B3385632-FF45-F244-AE32-F8808F10C6A8}"/>
+                        </a:ext>
+                      </a:extLst>
+                    </p:cNvPr>
+                    <p:cNvGrpSpPr/>
+                    <p:nvPr/>
+                  </p:nvGrpSpPr>
+                  <p:grpSpPr>
+                    <a:xfrm>
+                      <a:off x="2265680" y="1595120"/>
+                      <a:ext cx="6207760" cy="1833880"/>
+                      <a:chOff x="2265680" y="1595120"/>
+                      <a:chExt cx="6207760" cy="1833880"/>
+                    </a:xfrm>
+                  </p:grpSpPr>
+                  <p:sp>
+                    <p:nvSpPr>
+                      <p:cNvPr id="5" name="TextBox 4">
+                        <a:extLst>
+                          <a:ext uri="{FF2B5EF4-FFF2-40B4-BE49-F238E27FC236}">
+                            <a16:creationId xmlns:a16="http://schemas.microsoft.com/office/drawing/2014/main" id="{D172F9E8-4DA1-6042-9741-E8DA270C6FAA}"/>
+                          </a:ext>
+                        </a:extLst>
+                      </p:cNvPr>
+                      <p:cNvSpPr txBox="1"/>
+                      <p:nvPr/>
+                    </p:nvSpPr>
+                    <p:spPr>
+                      <a:xfrm>
+                        <a:off x="7122160" y="1595120"/>
+                        <a:ext cx="1351280" cy="646331"/>
+                      </a:xfrm>
+                      <a:prstGeom prst="rect">
+                        <a:avLst/>
+                      </a:prstGeom>
+                      <a:noFill/>
+                    </p:spPr>
+                    <p:txBody>
+                      <a:bodyPr wrap="square" rtlCol="0">
+                        <a:spAutoFit/>
+                      </a:bodyPr>
+                      <a:lstStyle/>
+                      <a:p>
+                        <a:pPr algn="ctr"/>
+                        <a:r>
+                          <a:rPr lang="en-US" b="1" dirty="0"/>
+                          <a:t>Person 1: (3, 2)</a:t>
+                        </a:r>
+                      </a:p>
+                    </p:txBody>
+                  </p:sp>
+                  <p:sp>
+                    <p:nvSpPr>
+                      <p:cNvPr id="22" name="TextBox 21">
+                        <a:extLst>
+                          <a:ext uri="{FF2B5EF4-FFF2-40B4-BE49-F238E27FC236}">
+                            <a16:creationId xmlns:a16="http://schemas.microsoft.com/office/drawing/2014/main" id="{670EF1CB-49CE-514E-A7C6-FB09AD828D2A}"/>
+                          </a:ext>
+                        </a:extLst>
+                      </p:cNvPr>
+                      <p:cNvSpPr txBox="1"/>
+                      <p:nvPr/>
+                    </p:nvSpPr>
+                    <p:spPr>
+                      <a:xfrm>
+                        <a:off x="2265680" y="2782669"/>
+                        <a:ext cx="1351280" cy="646331"/>
+                      </a:xfrm>
+                      <a:prstGeom prst="rect">
+                        <a:avLst/>
+                      </a:prstGeom>
+                      <a:noFill/>
+                    </p:spPr>
+                    <p:txBody>
+                      <a:bodyPr wrap="square" rtlCol="0">
+                        <a:spAutoFit/>
+                      </a:bodyPr>
+                      <a:lstStyle/>
+                      <a:p>
+                        <a:pPr algn="ctr"/>
+                        <a:r>
+                          <a:rPr lang="en-US" b="1" dirty="0"/>
+                          <a:t>Person 2: (1, 1.5)</a:t>
+                        </a:r>
+                      </a:p>
+                    </p:txBody>
+                  </p:sp>
+                </p:grpSp>
+                <p:sp>
+                  <p:nvSpPr>
+                    <p:cNvPr id="8" name="TextBox 7">
+                      <a:extLst>
+                        <a:ext uri="{FF2B5EF4-FFF2-40B4-BE49-F238E27FC236}">
+                          <a16:creationId xmlns:a16="http://schemas.microsoft.com/office/drawing/2014/main" id="{5944F8AC-F337-4D45-AFFC-9197441D974F}"/>
+                        </a:ext>
+                      </a:extLst>
+                    </p:cNvPr>
+                    <p:cNvSpPr txBox="1"/>
+                    <p:nvPr/>
+                  </p:nvSpPr>
+                  <p:spPr>
+                    <a:xfrm>
+                      <a:off x="4744720" y="4001869"/>
+                      <a:ext cx="1330960" cy="646331"/>
+                    </a:xfrm>
+                    <a:prstGeom prst="rect">
+                      <a:avLst/>
+                    </a:prstGeom>
+                    <a:noFill/>
+                  </p:spPr>
+                  <p:txBody>
+                    <a:bodyPr wrap="square" rtlCol="0">
+                      <a:spAutoFit/>
+                    </a:bodyPr>
+                    <a:lstStyle/>
+                    <a:p>
+                      <a:pPr algn="ctr"/>
+                      <a:r>
+                        <a:rPr lang="en-US" b="1" dirty="0"/>
+                        <a:t>Person 3: (2, 1)</a:t>
+                      </a:r>
+                    </a:p>
+                  </p:txBody>
+                </p:sp>
+              </p:grpSp>
+              <p:sp>
+                <p:nvSpPr>
+                  <p:cNvPr id="10" name="TextBox 9">
+                    <a:extLst>
+                      <a:ext uri="{FF2B5EF4-FFF2-40B4-BE49-F238E27FC236}">
+                        <a16:creationId xmlns:a16="http://schemas.microsoft.com/office/drawing/2014/main" id="{A6B0FE71-0FDE-114E-93C4-3AE115AE9FC1}"/>
+                      </a:ext>
+                    </a:extLst>
+                  </p:cNvPr>
+                  <p:cNvSpPr txBox="1"/>
+                  <p:nvPr/>
+                </p:nvSpPr>
+                <p:spPr>
+                  <a:xfrm>
+                    <a:off x="5537200" y="2355949"/>
+                    <a:ext cx="1351280" cy="646331"/>
+                  </a:xfrm>
+                  <a:prstGeom prst="rect">
+                    <a:avLst/>
+                  </a:prstGeom>
+                  <a:noFill/>
+                </p:spPr>
+                <p:txBody>
+                  <a:bodyPr wrap="square" rtlCol="0">
+                    <a:spAutoFit/>
+                  </a:bodyPr>
+                  <a:lstStyle/>
+                  <a:p>
+                    <a:pPr algn="ctr"/>
+                    <a:r>
+                      <a:rPr lang="en-US" b="1" dirty="0"/>
+                      <a:t>Person 4: (2.34, 1.67)</a:t>
+                    </a:r>
+                  </a:p>
+                </p:txBody>
+              </p:sp>
+            </p:grpSp>
+            <p:sp>
+              <p:nvSpPr>
+                <p:cNvPr id="11" name="TextBox 10">
+                  <a:extLst>
+                    <a:ext uri="{FF2B5EF4-FFF2-40B4-BE49-F238E27FC236}">
+                      <a16:creationId xmlns:a16="http://schemas.microsoft.com/office/drawing/2014/main" id="{83C3A677-F843-B740-BE28-9A6F0DC99962}"/>
+                    </a:ext>
+                  </a:extLst>
+                </p:cNvPr>
+                <p:cNvSpPr txBox="1"/>
+                <p:nvPr/>
+              </p:nvSpPr>
+              <p:spPr>
+                <a:xfrm>
+                  <a:off x="385461" y="3189069"/>
+                  <a:ext cx="1351280" cy="646331"/>
+                </a:xfrm>
+                <a:prstGeom prst="rect">
+                  <a:avLst/>
+                </a:prstGeom>
+                <a:noFill/>
+              </p:spPr>
+              <p:txBody>
+                <a:bodyPr wrap="square" rtlCol="0">
+                  <a:spAutoFit/>
+                </a:bodyPr>
+                <a:lstStyle/>
+                <a:p>
+                  <a:pPr algn="ctr"/>
+                  <a:r>
+                    <a:rPr lang="en-US" b="1" dirty="0"/>
+                    <a:t>Person 5: (0.21, 1.34)</a:t>
+                  </a:r>
+                </a:p>
+              </p:txBody>
+            </p:sp>
+          </p:grpSp>
+          <p:sp>
+            <p:nvSpPr>
+              <p:cNvPr id="14" name="TextBox 13">
+                <a:extLst>
+                  <a:ext uri="{FF2B5EF4-FFF2-40B4-BE49-F238E27FC236}">
+                    <a16:creationId xmlns:a16="http://schemas.microsoft.com/office/drawing/2014/main" id="{21D8FB79-9FDD-E74A-A68B-94F7FEAB328A}"/>
+                  </a:ext>
+                </a:extLst>
+              </p:cNvPr>
+              <p:cNvSpPr txBox="1"/>
+              <p:nvPr/>
+            </p:nvSpPr>
+            <p:spPr>
+              <a:xfrm>
+                <a:off x="8168640" y="4232424"/>
+                <a:ext cx="1605280" cy="646331"/>
+              </a:xfrm>
+              <a:prstGeom prst="rect">
+                <a:avLst/>
+              </a:prstGeom>
+              <a:noFill/>
+            </p:spPr>
+            <p:txBody>
+              <a:bodyPr wrap="square" rtlCol="0">
+                <a:spAutoFit/>
+              </a:bodyPr>
+              <a:lstStyle/>
+              <a:p>
+                <a:pPr algn="ctr"/>
+                <a:r>
+                  <a:rPr lang="en-US" b="1" dirty="0"/>
+                  <a:t>Person 6: (3.49, 0.88)</a:t>
+                </a:r>
+              </a:p>
+            </p:txBody>
+          </p:sp>
+        </p:grpSp>
+      </p:grpSp>
+    </p:spTree>
+    <p:extLst>
+      <p:ext uri="{BB962C8B-B14F-4D97-AF65-F5344CB8AC3E}">
+        <p14:creationId xmlns:p14="http://schemas.microsoft.com/office/powerpoint/2010/main" val="226340110"/>
+      </p:ext>
+    </p:extLst>
+  </p:cSld>
+  <p:clrMapOvr>
+    <a:masterClrMapping/>
+  </p:clrMapOvr>
+</p:sld>
+</file>
+
+<file path=ppt/slides/slide9.xml><?xml version="1.0" encoding="utf-8"?>
+<p:sld xmlns:a="http://schemas.openxmlformats.org/drawingml/2006/main" xmlns:r="http://schemas.openxmlformats.org/officeDocument/2006/relationships" xmlns:p="http://schemas.openxmlformats.org/presentationml/2006/main">
+  <p:cSld>
+    <p:spTree>
+      <p:nvGrpSpPr>
+        <p:cNvPr id="1" name=""/>
+        <p:cNvGrpSpPr/>
+        <p:nvPr/>
+      </p:nvGrpSpPr>
+      <p:grpSpPr>
+        <a:xfrm>
+          <a:off x="0" y="0"/>
+          <a:ext cx="0" cy="0"/>
+          <a:chOff x="0" y="0"/>
+          <a:chExt cx="0" cy="0"/>
+        </a:xfrm>
+      </p:grpSpPr>
+      <p:grpSp>
+        <p:nvGrpSpPr>
+          <p:cNvPr id="12" name="Group 11">
+            <a:extLst>
+              <a:ext uri="{FF2B5EF4-FFF2-40B4-BE49-F238E27FC236}">
+                <a16:creationId xmlns:a16="http://schemas.microsoft.com/office/drawing/2014/main" id="{67A81C41-B9B3-CD41-8984-22B1C94CD571}"/>
+              </a:ext>
+            </a:extLst>
+          </p:cNvPr>
+          <p:cNvGrpSpPr/>
+          <p:nvPr/>
+        </p:nvGrpSpPr>
+        <p:grpSpPr>
+          <a:xfrm>
+            <a:off x="0" y="0"/>
+            <a:ext cx="10455259" cy="6858000"/>
+            <a:chOff x="0" y="0"/>
+            <a:chExt cx="10455259" cy="6858000"/>
+          </a:xfrm>
+        </p:grpSpPr>
+        <p:grpSp>
+          <p:nvGrpSpPr>
+            <p:cNvPr id="9" name="Group 8">
+              <a:extLst>
+                <a:ext uri="{FF2B5EF4-FFF2-40B4-BE49-F238E27FC236}">
+                  <a16:creationId xmlns:a16="http://schemas.microsoft.com/office/drawing/2014/main" id="{2944C7DF-904A-4E41-9652-50CA18481D5D}"/>
+                </a:ext>
+              </a:extLst>
+            </p:cNvPr>
+            <p:cNvGrpSpPr/>
+            <p:nvPr/>
+          </p:nvGrpSpPr>
+          <p:grpSpPr>
+            <a:xfrm>
+              <a:off x="0" y="0"/>
+              <a:ext cx="10455259" cy="6858000"/>
+              <a:chOff x="0" y="0"/>
+              <a:chExt cx="10455259" cy="6858000"/>
+            </a:xfrm>
+          </p:grpSpPr>
+          <p:pic>
+            <p:nvPicPr>
+              <p:cNvPr id="15" name="Picture 14" descr="A picture containing line, parallel, screenshot, number&#10;&#10;Description automatically generated">
+                <a:extLst>
+                  <a:ext uri="{FF2B5EF4-FFF2-40B4-BE49-F238E27FC236}">
+                    <a16:creationId xmlns:a16="http://schemas.microsoft.com/office/drawing/2014/main" id="{2923B6CD-8BBA-D347-A876-4418EAD2F1D5}"/>
+                  </a:ext>
+                </a:extLst>
+              </p:cNvPr>
+              <p:cNvPicPr>
+                <a:picLocks noChangeAspect="1"/>
+              </p:cNvPicPr>
+              <p:nvPr/>
+            </p:nvPicPr>
+            <p:blipFill>
+              <a:blip r:embed="rId2"/>
+              <a:stretch>
+                <a:fillRect/>
+              </a:stretch>
+            </p:blipFill>
+            <p:spPr>
+              <a:xfrm>
+                <a:off x="0" y="0"/>
+                <a:ext cx="10455259" cy="6858000"/>
+              </a:xfrm>
+              <a:prstGeom prst="rect">
+                <a:avLst/>
+              </a:prstGeom>
+            </p:spPr>
+          </p:pic>
+          <p:grpSp>
+            <p:nvGrpSpPr>
+              <p:cNvPr id="4" name="Group 3">
+                <a:extLst>
+                  <a:ext uri="{FF2B5EF4-FFF2-40B4-BE49-F238E27FC236}">
+                    <a16:creationId xmlns:a16="http://schemas.microsoft.com/office/drawing/2014/main" id="{531B3B4C-629B-4747-AE09-AC99BC678637}"/>
+                  </a:ext>
+                </a:extLst>
+              </p:cNvPr>
+              <p:cNvGrpSpPr/>
+              <p:nvPr/>
+            </p:nvGrpSpPr>
+            <p:grpSpPr>
+              <a:xfrm>
+                <a:off x="385461" y="1595120"/>
+                <a:ext cx="8087979" cy="3053080"/>
+                <a:chOff x="385461" y="1595120"/>
+                <a:chExt cx="8087979" cy="3053080"/>
+              </a:xfrm>
+            </p:grpSpPr>
+            <p:grpSp>
+              <p:nvGrpSpPr>
+                <p:cNvPr id="3" name="Group 2">
+                  <a:extLst>
+                    <a:ext uri="{FF2B5EF4-FFF2-40B4-BE49-F238E27FC236}">
+                      <a16:creationId xmlns:a16="http://schemas.microsoft.com/office/drawing/2014/main" id="{CA9C4F6C-056C-8841-BF44-5B258063E882}"/>
+                    </a:ext>
+                  </a:extLst>
+                </p:cNvPr>
+                <p:cNvGrpSpPr/>
+                <p:nvPr/>
+              </p:nvGrpSpPr>
+              <p:grpSpPr>
+                <a:xfrm>
+                  <a:off x="2265680" y="1595120"/>
+                  <a:ext cx="6207760" cy="3053080"/>
+                  <a:chOff x="2265680" y="1595120"/>
+                  <a:chExt cx="6207760" cy="3053080"/>
+                </a:xfrm>
+              </p:grpSpPr>
+              <p:grpSp>
+                <p:nvGrpSpPr>
+                  <p:cNvPr id="2" name="Group 1">
+                    <a:extLst>
+                      <a:ext uri="{FF2B5EF4-FFF2-40B4-BE49-F238E27FC236}">
+                        <a16:creationId xmlns:a16="http://schemas.microsoft.com/office/drawing/2014/main" id="{7BA514FC-AC68-304A-A3D6-08E5B16D54F1}"/>
+                      </a:ext>
+                    </a:extLst>
+                  </p:cNvPr>
+                  <p:cNvGrpSpPr/>
+                  <p:nvPr/>
+                </p:nvGrpSpPr>
+                <p:grpSpPr>
+                  <a:xfrm>
+                    <a:off x="2265680" y="1595120"/>
+                    <a:ext cx="6207760" cy="3053080"/>
+                    <a:chOff x="2265680" y="1595120"/>
+                    <a:chExt cx="6207760" cy="3053080"/>
+                  </a:xfrm>
+                </p:grpSpPr>
+                <p:grpSp>
+                  <p:nvGrpSpPr>
+                    <p:cNvPr id="7" name="Group 6">
+                      <a:extLst>
+                        <a:ext uri="{FF2B5EF4-FFF2-40B4-BE49-F238E27FC236}">
+                          <a16:creationId xmlns:a16="http://schemas.microsoft.com/office/drawing/2014/main" id="{B3385632-FF45-F244-AE32-F8808F10C6A8}"/>
+                        </a:ext>
+                      </a:extLst>
+                    </p:cNvPr>
+                    <p:cNvGrpSpPr/>
+                    <p:nvPr/>
+                  </p:nvGrpSpPr>
+                  <p:grpSpPr>
+                    <a:xfrm>
+                      <a:off x="2265680" y="1595120"/>
+                      <a:ext cx="6207760" cy="1833880"/>
+                      <a:chOff x="2265680" y="1595120"/>
+                      <a:chExt cx="6207760" cy="1833880"/>
+                    </a:xfrm>
+                  </p:grpSpPr>
+                  <p:sp>
+                    <p:nvSpPr>
+                      <p:cNvPr id="5" name="TextBox 4">
+                        <a:extLst>
+                          <a:ext uri="{FF2B5EF4-FFF2-40B4-BE49-F238E27FC236}">
+                            <a16:creationId xmlns:a16="http://schemas.microsoft.com/office/drawing/2014/main" id="{D172F9E8-4DA1-6042-9741-E8DA270C6FAA}"/>
+                          </a:ext>
+                        </a:extLst>
+                      </p:cNvPr>
+                      <p:cNvSpPr txBox="1"/>
+                      <p:nvPr/>
+                    </p:nvSpPr>
+                    <p:spPr>
+                      <a:xfrm>
+                        <a:off x="7122160" y="1595120"/>
+                        <a:ext cx="1351280" cy="646331"/>
+                      </a:xfrm>
+                      <a:prstGeom prst="rect">
+                        <a:avLst/>
+                      </a:prstGeom>
+                      <a:noFill/>
+                    </p:spPr>
+                    <p:txBody>
+                      <a:bodyPr wrap="square" rtlCol="0">
+                        <a:spAutoFit/>
+                      </a:bodyPr>
+                      <a:lstStyle/>
+                      <a:p>
+                        <a:pPr algn="ctr"/>
+                        <a:r>
+                          <a:rPr lang="en-US" b="1" dirty="0"/>
+                          <a:t>Person 1: (3, 2)</a:t>
+                        </a:r>
+                      </a:p>
+                    </p:txBody>
+                  </p:sp>
+                  <p:sp>
+                    <p:nvSpPr>
+                      <p:cNvPr id="22" name="TextBox 21">
+                        <a:extLst>
+                          <a:ext uri="{FF2B5EF4-FFF2-40B4-BE49-F238E27FC236}">
+                            <a16:creationId xmlns:a16="http://schemas.microsoft.com/office/drawing/2014/main" id="{670EF1CB-49CE-514E-A7C6-FB09AD828D2A}"/>
+                          </a:ext>
+                        </a:extLst>
+                      </p:cNvPr>
+                      <p:cNvSpPr txBox="1"/>
+                      <p:nvPr/>
+                    </p:nvSpPr>
+                    <p:spPr>
+                      <a:xfrm>
+                        <a:off x="2265680" y="2782669"/>
+                        <a:ext cx="1351280" cy="646331"/>
+                      </a:xfrm>
+                      <a:prstGeom prst="rect">
+                        <a:avLst/>
+                      </a:prstGeom>
+                      <a:noFill/>
+                    </p:spPr>
+                    <p:txBody>
+                      <a:bodyPr wrap="square" rtlCol="0">
+                        <a:spAutoFit/>
+                      </a:bodyPr>
+                      <a:lstStyle/>
+                      <a:p>
+                        <a:pPr algn="ctr"/>
+                        <a:r>
+                          <a:rPr lang="en-US" b="1" dirty="0"/>
+                          <a:t>Person 2: (1, 1.5)</a:t>
+                        </a:r>
+                      </a:p>
+                    </p:txBody>
+                  </p:sp>
+                </p:grpSp>
+                <p:sp>
+                  <p:nvSpPr>
+                    <p:cNvPr id="8" name="TextBox 7">
+                      <a:extLst>
+                        <a:ext uri="{FF2B5EF4-FFF2-40B4-BE49-F238E27FC236}">
+                          <a16:creationId xmlns:a16="http://schemas.microsoft.com/office/drawing/2014/main" id="{5944F8AC-F337-4D45-AFFC-9197441D974F}"/>
+                        </a:ext>
+                      </a:extLst>
+                    </p:cNvPr>
+                    <p:cNvSpPr txBox="1"/>
+                    <p:nvPr/>
+                  </p:nvSpPr>
+                  <p:spPr>
+                    <a:xfrm>
+                      <a:off x="4744720" y="4001869"/>
+                      <a:ext cx="1330960" cy="646331"/>
+                    </a:xfrm>
+                    <a:prstGeom prst="rect">
+                      <a:avLst/>
+                    </a:prstGeom>
+                    <a:noFill/>
+                  </p:spPr>
+                  <p:txBody>
+                    <a:bodyPr wrap="square" rtlCol="0">
+                      <a:spAutoFit/>
+                    </a:bodyPr>
+                    <a:lstStyle/>
+                    <a:p>
+                      <a:pPr algn="ctr"/>
+                      <a:r>
+                        <a:rPr lang="en-US" b="1" dirty="0"/>
+                        <a:t>Person 3: (2, 1)</a:t>
+                      </a:r>
+                    </a:p>
+                  </p:txBody>
+                </p:sp>
+              </p:grpSp>
+              <p:sp>
+                <p:nvSpPr>
+                  <p:cNvPr id="10" name="TextBox 9">
+                    <a:extLst>
+                      <a:ext uri="{FF2B5EF4-FFF2-40B4-BE49-F238E27FC236}">
+                        <a16:creationId xmlns:a16="http://schemas.microsoft.com/office/drawing/2014/main" id="{A6B0FE71-0FDE-114E-93C4-3AE115AE9FC1}"/>
+                      </a:ext>
+                    </a:extLst>
+                  </p:cNvPr>
+                  <p:cNvSpPr txBox="1"/>
+                  <p:nvPr/>
+                </p:nvSpPr>
+                <p:spPr>
+                  <a:xfrm>
+                    <a:off x="5537200" y="2355949"/>
+                    <a:ext cx="1351280" cy="646331"/>
+                  </a:xfrm>
+                  <a:prstGeom prst="rect">
+                    <a:avLst/>
+                  </a:prstGeom>
+                  <a:noFill/>
+                </p:spPr>
+                <p:txBody>
+                  <a:bodyPr wrap="square" rtlCol="0">
+                    <a:spAutoFit/>
+                  </a:bodyPr>
+                  <a:lstStyle/>
+                  <a:p>
+                    <a:pPr algn="ctr"/>
+                    <a:r>
+                      <a:rPr lang="en-US" b="1" dirty="0"/>
+                      <a:t>Person 4: (2.34, 1.67)</a:t>
+                    </a:r>
+                  </a:p>
+                </p:txBody>
+              </p:sp>
+            </p:grpSp>
+            <p:sp>
+              <p:nvSpPr>
+                <p:cNvPr id="11" name="TextBox 10">
+                  <a:extLst>
+                    <a:ext uri="{FF2B5EF4-FFF2-40B4-BE49-F238E27FC236}">
+                      <a16:creationId xmlns:a16="http://schemas.microsoft.com/office/drawing/2014/main" id="{83C3A677-F843-B740-BE28-9A6F0DC99962}"/>
+                    </a:ext>
+                  </a:extLst>
+                </p:cNvPr>
+                <p:cNvSpPr txBox="1"/>
+                <p:nvPr/>
+              </p:nvSpPr>
+              <p:spPr>
+                <a:xfrm>
+                  <a:off x="385461" y="3189069"/>
+                  <a:ext cx="1351280" cy="646331"/>
+                </a:xfrm>
+                <a:prstGeom prst="rect">
+                  <a:avLst/>
+                </a:prstGeom>
+                <a:noFill/>
+              </p:spPr>
+              <p:txBody>
+                <a:bodyPr wrap="square" rtlCol="0">
+                  <a:spAutoFit/>
+                </a:bodyPr>
+                <a:lstStyle/>
+                <a:p>
+                  <a:pPr algn="ctr"/>
+                  <a:r>
+                    <a:rPr lang="en-US" b="1" dirty="0"/>
+                    <a:t>Person 5: (0.21, 1.34)</a:t>
+                  </a:r>
+                </a:p>
+              </p:txBody>
+            </p:sp>
+          </p:grpSp>
+          <p:sp>
+            <p:nvSpPr>
+              <p:cNvPr id="16" name="TextBox 15">
+                <a:extLst>
+                  <a:ext uri="{FF2B5EF4-FFF2-40B4-BE49-F238E27FC236}">
+                    <a16:creationId xmlns:a16="http://schemas.microsoft.com/office/drawing/2014/main" id="{6FAA6142-DDDF-834C-8221-E9A8BBD7EBA6}"/>
+                  </a:ext>
+                </a:extLst>
+              </p:cNvPr>
+              <p:cNvSpPr txBox="1"/>
+              <p:nvPr/>
+            </p:nvSpPr>
+            <p:spPr>
+              <a:xfrm>
+                <a:off x="2753360" y="5769709"/>
+                <a:ext cx="1351280" cy="646331"/>
+              </a:xfrm>
+              <a:prstGeom prst="rect">
+                <a:avLst/>
+              </a:prstGeom>
+              <a:noFill/>
+            </p:spPr>
+            <p:txBody>
+              <a:bodyPr wrap="square" rtlCol="0">
+                <a:spAutoFit/>
+              </a:bodyPr>
+              <a:lstStyle/>
+              <a:p>
+                <a:pPr algn="ctr"/>
+                <a:r>
+                  <a:rPr lang="en-US" b="1" dirty="0"/>
+                  <a:t>Person 7: (1.21, 0.22)</a:t>
+                </a:r>
+              </a:p>
+            </p:txBody>
+          </p:sp>
+        </p:grpSp>
+        <p:sp>
+          <p:nvSpPr>
+            <p:cNvPr id="17" name="TextBox 16">
+              <a:extLst>
+                <a:ext uri="{FF2B5EF4-FFF2-40B4-BE49-F238E27FC236}">
+                  <a16:creationId xmlns:a16="http://schemas.microsoft.com/office/drawing/2014/main" id="{DED61EA8-CBD5-5447-AC35-D3745AE75927}"/>
+                </a:ext>
+              </a:extLst>
+            </p:cNvPr>
+            <p:cNvSpPr txBox="1"/>
+            <p:nvPr/>
+          </p:nvSpPr>
+          <p:spPr>
+            <a:xfrm>
+              <a:off x="8168640" y="4232424"/>
+              <a:ext cx="1605280" cy="646331"/>
+            </a:xfrm>
+            <a:prstGeom prst="rect">
+              <a:avLst/>
+            </a:prstGeom>
+            <a:noFill/>
+          </p:spPr>
+          <p:txBody>
+            <a:bodyPr wrap="square" rtlCol="0">
+              <a:spAutoFit/>
+            </a:bodyPr>
+            <a:lstStyle/>
+            <a:p>
+              <a:pPr algn="ctr"/>
+              <a:r>
+                <a:rPr lang="en-US" b="1" dirty="0"/>
+                <a:t>Person 6: (3.49, 0.88)</a:t>
+              </a:r>
+            </a:p>
+          </p:txBody>
+        </p:sp>
+      </p:grpSp>
+    </p:spTree>
+    <p:extLst>
+      <p:ext uri="{BB962C8B-B14F-4D97-AF65-F5344CB8AC3E}">
+        <p14:creationId xmlns:p14="http://schemas.microsoft.com/office/powerpoint/2010/main" val="3620485953"/>
       </p:ext>
     </p:extLst>
   </p:cSld>

</xml_diff>